<commit_message>
Update ACDC Framework presentation
Revised the ACDC_Framework_Final_v6.pptx file with new changes. See the updated presentation for details.
</commit_message>
<xml_diff>
--- a/documents/presentations/general/ACDC_Framework_Final_v6.pptx
+++ b/documents/presentations/general/ACDC_Framework_Final_v6.pptx
@@ -11074,8 +11074,8 @@
           </a:p>
         </p:txBody>
       </p:sp>
-      <mc:AlternateContent xmlns:mc="http://schemas.openxmlformats.org/markup-compatibility/2006">
-        <mc:Choice xmlns:a14="http://schemas.microsoft.com/office/drawing/2010/main" Requires="a14">
+      <mc:AlternateContent xmlns:mc="http://schemas.openxmlformats.org/markup-compatibility/2006" xmlns:a14="http://schemas.microsoft.com/office/drawing/2010/main">
+        <mc:Choice Requires="a14">
           <p:sp>
             <p:nvSpPr>
               <p:cNvPr id="3" name="Content Placeholder 2"/>
@@ -11298,7 +11298,7 @@
             </p:txBody>
           </p:sp>
         </mc:Choice>
-        <mc:Fallback>
+        <mc:Fallback xmlns="">
           <p:sp>
             <p:nvSpPr>
               <p:cNvPr id="3" name="Content Placeholder 2"/>
@@ -12469,8 +12469,16 @@
             </a:pPr>
             <a:r>
               <a:rPr dirty="0"/>
-              <a:t>From Template to Study: Three Layers</a:t>
-            </a:r>
+              <a:t>From Template to Study: </a:t>
+            </a:r>
+            <a:r>
+              <a:rPr lang="da-DK"/>
+              <a:t>Model </a:t>
+            </a:r>
+            <a:r>
+              <a:t>Layers</a:t>
+            </a:r>
+            <a:endParaRPr dirty="0"/>
           </a:p>
           <a:p>
             <a:pPr marL="365760" indent="-182880" algn="l">
@@ -13565,8 +13573,8 @@
           </a:p>
         </p:txBody>
       </p:sp>
-      <mc:AlternateContent xmlns:mc="http://schemas.openxmlformats.org/markup-compatibility/2006">
-        <mc:Choice xmlns:a14="http://schemas.microsoft.com/office/drawing/2010/main" Requires="a14">
+      <mc:AlternateContent xmlns:mc="http://schemas.openxmlformats.org/markup-compatibility/2006" xmlns:a14="http://schemas.microsoft.com/office/drawing/2010/main">
+        <mc:Choice Requires="a14">
           <p:sp>
             <p:nvSpPr>
               <p:cNvPr id="3" name="Content Placeholder 2">
@@ -13733,7 +13741,7 @@
             </p:txBody>
           </p:sp>
         </mc:Choice>
-        <mc:Fallback>
+        <mc:Fallback xmlns="">
           <p:sp>
             <p:nvSpPr>
               <p:cNvPr id="3" name="Content Placeholder 2">
@@ -21375,6 +21383,27 @@
 </file>
 
 <file path=customXml/item1.xml><?xml version="1.0" encoding="utf-8"?>
+<?mso-contentType ?>
+<FormTemplates xmlns="http://schemas.microsoft.com/sharepoint/v3/contenttype/forms">
+  <Display>DocumentLibraryForm</Display>
+  <Edit>DocumentLibraryForm</Edit>
+  <New>DocumentLibraryForm</New>
+</FormTemplates>
+</file>
+
+<file path=customXml/item2.xml><?xml version="1.0" encoding="utf-8"?>
+<p:properties xmlns:p="http://schemas.microsoft.com/office/2006/metadata/properties" xmlns:xsi="http://www.w3.org/2001/XMLSchema-instance" xmlns:pc="http://schemas.microsoft.com/office/infopath/2007/PartnerControls">
+  <documentManagement>
+    <MediaLengthInSeconds xmlns="98eacbea-7562-4a40-a7f2-e999cdc0cec5" xsi:nil="true"/>
+    <lcf76f155ced4ddcb4097134ff3c332f xmlns="98eacbea-7562-4a40-a7f2-e999cdc0cec5">
+      <Terms xmlns="http://schemas.microsoft.com/office/infopath/2007/PartnerControls"/>
+    </lcf76f155ced4ddcb4097134ff3c332f>
+    <TaxCatchAll xmlns="75bf9804-c18d-470a-a27f-eeaf4abcd247" xsi:nil="true"/>
+  </documentManagement>
+</p:properties>
+</file>
+
+<file path=customXml/item3.xml><?xml version="1.0" encoding="utf-8"?>
 <ct:contentTypeSchema xmlns:ct="http://schemas.microsoft.com/office/2006/metadata/contentType" xmlns:ma="http://schemas.microsoft.com/office/2006/metadata/properties/metaAttributes" ct:_="" ma:_="" ma:contentTypeName="Document" ma:contentTypeID="0x010100D47D794EB48E7144959FE534A5ED3D9A" ma:contentTypeVersion="13" ma:contentTypeDescription="Create a new document." ma:contentTypeScope="" ma:versionID="332ebed6bf1f21540ac8ed4139e2af2e">
   <xsd:schema xmlns:xsd="http://www.w3.org/2001/XMLSchema" xmlns:xs="http://www.w3.org/2001/XMLSchema" xmlns:p="http://schemas.microsoft.com/office/2006/metadata/properties" xmlns:ns2="98eacbea-7562-4a40-a7f2-e999cdc0cec5" xmlns:ns3="75bf9804-c18d-470a-a27f-eeaf4abcd247" targetNamespace="http://schemas.microsoft.com/office/2006/metadata/properties" ma:root="true" ma:fieldsID="9643d50ff51ef4e8f7efba950a0a6c6b" ns2:_="" ns3:_="">
     <xsd:import namespace="98eacbea-7562-4a40-a7f2-e999cdc0cec5"/>
@@ -21581,42 +21610,10 @@
 </ct:contentTypeSchema>
 </file>
 
-<file path=customXml/item2.xml><?xml version="1.0" encoding="utf-8"?>
-<p:properties xmlns:p="http://schemas.microsoft.com/office/2006/metadata/properties" xmlns:xsi="http://www.w3.org/2001/XMLSchema-instance" xmlns:pc="http://schemas.microsoft.com/office/infopath/2007/PartnerControls">
-  <documentManagement>
-    <MediaLengthInSeconds xmlns="98eacbea-7562-4a40-a7f2-e999cdc0cec5" xsi:nil="true"/>
-    <lcf76f155ced4ddcb4097134ff3c332f xmlns="98eacbea-7562-4a40-a7f2-e999cdc0cec5">
-      <Terms xmlns="http://schemas.microsoft.com/office/infopath/2007/PartnerControls"/>
-    </lcf76f155ced4ddcb4097134ff3c332f>
-    <TaxCatchAll xmlns="75bf9804-c18d-470a-a27f-eeaf4abcd247" xsi:nil="true"/>
-  </documentManagement>
-</p:properties>
-</file>
-
-<file path=customXml/item3.xml><?xml version="1.0" encoding="utf-8"?>
-<?mso-contentType ?>
-<FormTemplates xmlns="http://schemas.microsoft.com/sharepoint/v3/contenttype/forms">
-  <Display>DocumentLibraryForm</Display>
-  <Edit>DocumentLibraryForm</Edit>
-  <New>DocumentLibraryForm</New>
-</FormTemplates>
-</file>
-
 <file path=customXml/itemProps1.xml><?xml version="1.0" encoding="utf-8"?>
-<ds:datastoreItem xmlns:ds="http://schemas.openxmlformats.org/officeDocument/2006/customXml" ds:itemID="{39A0DB44-58DC-4864-B5DB-6A708BBC1847}">
+<ds:datastoreItem xmlns:ds="http://schemas.openxmlformats.org/officeDocument/2006/customXml" ds:itemID="{3B69330B-154C-43B9-AAF7-1A571867C6C9}">
   <ds:schemaRefs>
-    <ds:schemaRef ds:uri="http://schemas.microsoft.com/office/2006/metadata/contentType"/>
-    <ds:schemaRef ds:uri="http://schemas.microsoft.com/office/2006/metadata/properties/metaAttributes"/>
-    <ds:schemaRef ds:uri="http://www.w3.org/2001/XMLSchema"/>
-    <ds:schemaRef ds:uri="http://schemas.microsoft.com/office/2006/metadata/properties"/>
-    <ds:schemaRef ds:uri="98eacbea-7562-4a40-a7f2-e999cdc0cec5"/>
-    <ds:schemaRef ds:uri="75bf9804-c18d-470a-a27f-eeaf4abcd247"/>
-    <ds:schemaRef ds:uri="http://schemas.microsoft.com/office/2006/documentManagement/types"/>
-    <ds:schemaRef ds:uri="http://schemas.microsoft.com/office/infopath/2007/PartnerControls"/>
-    <ds:schemaRef ds:uri="http://schemas.openxmlformats.org/package/2006/metadata/core-properties"/>
-    <ds:schemaRef ds:uri="http://purl.org/dc/elements/1.1/"/>
-    <ds:schemaRef ds:uri="http://purl.org/dc/terms/"/>
-    <ds:schemaRef ds:uri="http://schemas.microsoft.com/internal/obd"/>
+    <ds:schemaRef ds:uri="http://schemas.microsoft.com/sharepoint/v3/contenttype/forms"/>
   </ds:schemaRefs>
 </ds:datastoreItem>
 </file>
@@ -21643,9 +21640,20 @@
 </file>
 
 <file path=customXml/itemProps3.xml><?xml version="1.0" encoding="utf-8"?>
-<ds:datastoreItem xmlns:ds="http://schemas.openxmlformats.org/officeDocument/2006/customXml" ds:itemID="{3B69330B-154C-43B9-AAF7-1A571867C6C9}">
+<ds:datastoreItem xmlns:ds="http://schemas.openxmlformats.org/officeDocument/2006/customXml" ds:itemID="{39A0DB44-58DC-4864-B5DB-6A708BBC1847}">
   <ds:schemaRefs>
-    <ds:schemaRef ds:uri="http://schemas.microsoft.com/sharepoint/v3/contenttype/forms"/>
+    <ds:schemaRef ds:uri="http://schemas.microsoft.com/office/2006/metadata/contentType"/>
+    <ds:schemaRef ds:uri="http://schemas.microsoft.com/office/2006/metadata/properties/metaAttributes"/>
+    <ds:schemaRef ds:uri="http://www.w3.org/2001/XMLSchema"/>
+    <ds:schemaRef ds:uri="http://schemas.microsoft.com/office/2006/metadata/properties"/>
+    <ds:schemaRef ds:uri="98eacbea-7562-4a40-a7f2-e999cdc0cec5"/>
+    <ds:schemaRef ds:uri="75bf9804-c18d-470a-a27f-eeaf4abcd247"/>
+    <ds:schemaRef ds:uri="http://schemas.microsoft.com/office/2006/documentManagement/types"/>
+    <ds:schemaRef ds:uri="http://schemas.microsoft.com/office/infopath/2007/PartnerControls"/>
+    <ds:schemaRef ds:uri="http://schemas.openxmlformats.org/package/2006/metadata/core-properties"/>
+    <ds:schemaRef ds:uri="http://purl.org/dc/elements/1.1/"/>
+    <ds:schemaRef ds:uri="http://purl.org/dc/terms/"/>
+    <ds:schemaRef ds:uri="http://schemas.microsoft.com/internal/obd"/>
   </ds:schemaRefs>
 </ds:datastoreItem>
 </file>
</xml_diff>